<commit_message>
Add Ivaylo's voice to the presentation\
</commit_message>
<xml_diff>
--- a/Documents/Presentation.pptx
+++ b/Documents/Presentation.pptx
@@ -9,7 +9,7 @@
     <p:sldId id="256" r:id="rId3"/>
     <p:sldId id="280" r:id="rId4"/>
     <p:sldId id="282" r:id="rId5"/>
-    <p:sldId id="283" r:id="rId6"/>
+    <p:sldId id="287" r:id="rId6"/>
     <p:sldId id="284" r:id="rId7"/>
     <p:sldId id="285" r:id="rId8"/>
     <p:sldId id="286" r:id="rId9"/>
@@ -266,7 +266,7 @@
           <a:p>
             <a:fld id="{F5786528-7071-46F5-A917-834BD68AB265}" type="datetimeFigureOut">
               <a:rPr lang="en-US" smtClean="0"/>
-              <a:t>11/7/2021</a:t>
+              <a:t>11/8/2021</a:t>
             </a:fld>
             <a:endParaRPr lang="en-US"/>
           </a:p>
@@ -464,7 +464,7 @@
           <a:p>
             <a:fld id="{F5786528-7071-46F5-A917-834BD68AB265}" type="datetimeFigureOut">
               <a:rPr lang="en-US" smtClean="0"/>
-              <a:t>11/7/2021</a:t>
+              <a:t>11/8/2021</a:t>
             </a:fld>
             <a:endParaRPr lang="en-US"/>
           </a:p>
@@ -672,7 +672,7 @@
           <a:p>
             <a:fld id="{F5786528-7071-46F5-A917-834BD68AB265}" type="datetimeFigureOut">
               <a:rPr lang="en-US" smtClean="0"/>
-              <a:t>11/7/2021</a:t>
+              <a:t>11/8/2021</a:t>
             </a:fld>
             <a:endParaRPr lang="en-US"/>
           </a:p>
@@ -973,7 +973,7 @@
           <a:p>
             <a:fld id="{83284890-85D2-4D7B-8EF5-15A9C1DB8F42}" type="datetimeFigureOut">
               <a:rPr lang="en-US" smtClean="0"/>
-              <a:t>11/7/2021</a:t>
+              <a:t>11/8/2021</a:t>
             </a:fld>
             <a:endParaRPr lang="en-US"/>
           </a:p>
@@ -1185,7 +1185,7 @@
           <a:p>
             <a:fld id="{D30BB376-B19C-488D-ABEB-03C7E6E9E3E0}" type="datetimeFigureOut">
               <a:rPr lang="en-US" smtClean="0"/>
-              <a:t>11/7/2021</a:t>
+              <a:t>11/8/2021</a:t>
             </a:fld>
             <a:endParaRPr lang="en-US" dirty="0"/>
           </a:p>
@@ -1525,7 +1525,7 @@
           <a:p>
             <a:fld id="{C6F822A4-8DA6-4447-9B1F-C5DB58435268}" type="datetimeFigureOut">
               <a:rPr lang="en-US" smtClean="0"/>
-              <a:t>11/7/2021</a:t>
+              <a:t>11/8/2021</a:t>
             </a:fld>
             <a:endParaRPr lang="en-US"/>
           </a:p>
@@ -1840,7 +1840,7 @@
           <a:p>
             <a:fld id="{E548D31E-DCDA-41A7-9C67-C4B11B94D21D}" type="datetimeFigureOut">
               <a:rPr lang="en-US" smtClean="0"/>
-              <a:t>11/7/2021</a:t>
+              <a:t>11/8/2021</a:t>
             </a:fld>
             <a:endParaRPr lang="en-US"/>
           </a:p>
@@ -2222,7 +2222,7 @@
           <a:p>
             <a:fld id="{9B3762C0-B258-48F1-ADE6-176B4174CCDD}" type="datetimeFigureOut">
               <a:rPr lang="en-US" smtClean="0"/>
-              <a:t>11/7/2021</a:t>
+              <a:t>11/8/2021</a:t>
             </a:fld>
             <a:endParaRPr lang="en-US"/>
           </a:p>
@@ -2343,7 +2343,7 @@
           <a:p>
             <a:fld id="{677919A6-33EB-49BD-A62F-1FA56B9F9712}" type="datetimeFigureOut">
               <a:rPr lang="en-US" smtClean="0"/>
-              <a:t>11/7/2021</a:t>
+              <a:t>11/8/2021</a:t>
             </a:fld>
             <a:endParaRPr lang="en-US"/>
           </a:p>
@@ -2563,7 +2563,7 @@
           <a:p>
             <a:fld id="{4D94136C-8742-45B2-AF27-D93DF72833A9}" type="datetimeFigureOut">
               <a:rPr lang="en-US" smtClean="0"/>
-              <a:t>11/7/2021</a:t>
+              <a:t>11/8/2021</a:t>
             </a:fld>
             <a:endParaRPr lang="en-US"/>
           </a:p>
@@ -2923,7 +2923,7 @@
           <a:p>
             <a:fld id="{DA16AA21-1863-4931-97CB-99D0A168701B}" type="datetimeFigureOut">
               <a:rPr lang="en-US" smtClean="0"/>
-              <a:t>11/7/2021</a:t>
+              <a:t>11/8/2021</a:t>
             </a:fld>
             <a:endParaRPr lang="en-US"/>
           </a:p>
@@ -3133,7 +3133,7 @@
           <a:p>
             <a:fld id="{F5786528-7071-46F5-A917-834BD68AB265}" type="datetimeFigureOut">
               <a:rPr lang="en-US" smtClean="0"/>
-              <a:t>11/7/2021</a:t>
+              <a:t>11/8/2021</a:t>
             </a:fld>
             <a:endParaRPr lang="en-US"/>
           </a:p>
@@ -3503,7 +3503,7 @@
           <a:p>
             <a:fld id="{3772C379-9A7C-4C87-A116-CBE9F58B04C5}" type="datetimeFigureOut">
               <a:rPr lang="en-US" smtClean="0"/>
-              <a:t>11/7/2021</a:t>
+              <a:t>11/8/2021</a:t>
             </a:fld>
             <a:endParaRPr lang="en-US"/>
           </a:p>
@@ -3676,7 +3676,7 @@
           <a:p>
             <a:fld id="{87157CC2-0FC8-4686-B024-99790E0F5162}" type="datetimeFigureOut">
               <a:rPr lang="en-US" smtClean="0"/>
-              <a:t>11/7/2021</a:t>
+              <a:t>11/8/2021</a:t>
             </a:fld>
             <a:endParaRPr lang="en-US"/>
           </a:p>
@@ -3937,7 +3937,7 @@
           <a:p>
             <a:fld id="{F6764DA5-CD3D-4590-A511-FCD3BC7A793E}" type="datetimeFigureOut">
               <a:rPr lang="en-US" smtClean="0"/>
-              <a:t>11/7/2021</a:t>
+              <a:t>11/8/2021</a:t>
             </a:fld>
             <a:endParaRPr lang="en-US"/>
           </a:p>
@@ -4203,7 +4203,7 @@
           <a:p>
             <a:fld id="{F5786528-7071-46F5-A917-834BD68AB265}" type="datetimeFigureOut">
               <a:rPr lang="en-US" smtClean="0"/>
-              <a:t>11/7/2021</a:t>
+              <a:t>11/8/2021</a:t>
             </a:fld>
             <a:endParaRPr lang="en-US"/>
           </a:p>
@@ -4468,7 +4468,7 @@
           <a:p>
             <a:fld id="{F5786528-7071-46F5-A917-834BD68AB265}" type="datetimeFigureOut">
               <a:rPr lang="en-US" smtClean="0"/>
-              <a:t>11/7/2021</a:t>
+              <a:t>11/8/2021</a:t>
             </a:fld>
             <a:endParaRPr lang="en-US"/>
           </a:p>
@@ -4880,7 +4880,7 @@
           <a:p>
             <a:fld id="{F5786528-7071-46F5-A917-834BD68AB265}" type="datetimeFigureOut">
               <a:rPr lang="en-US" smtClean="0"/>
-              <a:t>11/7/2021</a:t>
+              <a:t>11/8/2021</a:t>
             </a:fld>
             <a:endParaRPr lang="en-US"/>
           </a:p>
@@ -5021,7 +5021,7 @@
           <a:p>
             <a:fld id="{F5786528-7071-46F5-A917-834BD68AB265}" type="datetimeFigureOut">
               <a:rPr lang="en-US" smtClean="0"/>
-              <a:t>11/7/2021</a:t>
+              <a:t>11/8/2021</a:t>
             </a:fld>
             <a:endParaRPr lang="en-US"/>
           </a:p>
@@ -5134,7 +5134,7 @@
           <a:p>
             <a:fld id="{F5786528-7071-46F5-A917-834BD68AB265}" type="datetimeFigureOut">
               <a:rPr lang="en-US" smtClean="0"/>
-              <a:t>11/7/2021</a:t>
+              <a:t>11/8/2021</a:t>
             </a:fld>
             <a:endParaRPr lang="en-US"/>
           </a:p>
@@ -5445,7 +5445,7 @@
           <a:p>
             <a:fld id="{F5786528-7071-46F5-A917-834BD68AB265}" type="datetimeFigureOut">
               <a:rPr lang="en-US" smtClean="0"/>
-              <a:t>11/7/2021</a:t>
+              <a:t>11/8/2021</a:t>
             </a:fld>
             <a:endParaRPr lang="en-US"/>
           </a:p>
@@ -5733,7 +5733,7 @@
           <a:p>
             <a:fld id="{F5786528-7071-46F5-A917-834BD68AB265}" type="datetimeFigureOut">
               <a:rPr lang="en-US" smtClean="0"/>
-              <a:t>11/7/2021</a:t>
+              <a:t>11/8/2021</a:t>
             </a:fld>
             <a:endParaRPr lang="en-US"/>
           </a:p>
@@ -5974,7 +5974,7 @@
           <a:p>
             <a:fld id="{F5786528-7071-46F5-A917-834BD68AB265}" type="datetimeFigureOut">
               <a:rPr lang="en-US" smtClean="0"/>
-              <a:t>11/7/2021</a:t>
+              <a:t>11/8/2021</a:t>
             </a:fld>
             <a:endParaRPr lang="en-US"/>
           </a:p>
@@ -6602,7 +6602,7 @@
           <a:p>
             <a:fld id="{5DC5B261-8843-42D1-AAFC-05E20E2D9B97}" type="datetimeFigureOut">
               <a:rPr lang="en-US" smtClean="0"/>
-              <a:t>11/7/2021</a:t>
+              <a:t>11/8/2021</a:t>
             </a:fld>
             <a:endParaRPr lang="en-US" dirty="0"/>
           </a:p>
@@ -9770,11 +9770,11 @@
   <p:clrMapOvr>
     <a:masterClrMapping/>
   </p:clrMapOvr>
-  <mc:AlternateContent xmlns:mc="http://schemas.openxmlformats.org/markup-compatibility/2006">
-    <mc:Choice xmlns:p14="http://schemas.microsoft.com/office/powerpoint/2010/main" Requires="p14">
+  <mc:AlternateContent xmlns:mc="http://schemas.openxmlformats.org/markup-compatibility/2006" xmlns:p14="http://schemas.microsoft.com/office/powerpoint/2010/main">
+    <mc:Choice Requires="p14">
       <p:transition spd="slow" p14:dur="2000" advTm="6721"/>
     </mc:Choice>
-    <mc:Fallback>
+    <mc:Fallback xmlns="">
       <p:transition spd="slow" advTm="6721"/>
     </mc:Fallback>
   </mc:AlternateContent>
@@ -11131,13 +11131,13 @@
   <p:clrMapOvr>
     <a:masterClrMapping/>
   </p:clrMapOvr>
-  <mc:AlternateContent xmlns:mc="http://schemas.openxmlformats.org/markup-compatibility/2006">
-    <mc:Choice xmlns:p14="http://schemas.microsoft.com/office/powerpoint/2010/main" Requires="p14">
+  <mc:AlternateContent xmlns:mc="http://schemas.openxmlformats.org/markup-compatibility/2006" xmlns:p14="http://schemas.microsoft.com/office/powerpoint/2010/main">
+    <mc:Choice Requires="p14">
       <p:transition spd="med" p14:dur="700" advTm="18063">
         <p:fade/>
       </p:transition>
     </mc:Choice>
-    <mc:Fallback>
+    <mc:Fallback xmlns="">
       <p:transition spd="med" advTm="18063">
         <p:fade/>
       </p:transition>
@@ -12152,14 +12152,6 @@
 <file path=ppt/slides/slide4.xml><?xml version="1.0" encoding="utf-8"?>
 <p:sld xmlns:a="http://schemas.openxmlformats.org/drawingml/2006/main" xmlns:r="http://schemas.openxmlformats.org/officeDocument/2006/relationships" xmlns:p="http://schemas.openxmlformats.org/presentationml/2006/main">
   <p:cSld>
-    <p:bg>
-      <p:bgPr>
-        <a:solidFill>
-          <a:schemeClr val="bg2"/>
-        </a:solidFill>
-        <a:effectLst/>
-      </p:bgPr>
-    </p:bg>
     <p:spTree>
       <p:nvGrpSpPr>
         <p:cNvPr id="1" name=""/>
@@ -12174,150 +12166,165 @@
           <a:chExt cx="0" cy="0"/>
         </a:xfrm>
       </p:grpSpPr>
-      <p:sp useBgFill="1">
-        <p:nvSpPr>
-          <p:cNvPr id="12" name="Rectangle 11">
+      <p:sp>
+        <p:nvSpPr>
+          <p:cNvPr id="2" name="Title 1">
             <a:extLst>
               <a:ext uri="{FF2B5EF4-FFF2-40B4-BE49-F238E27FC236}">
-                <a16:creationId xmlns:a16="http://schemas.microsoft.com/office/drawing/2014/main" id="{0B8E8AF5-39F0-457F-920B-F62E2E0A0645}"/>
-              </a:ext>
-              <a:ext uri="{C183D7F6-B498-43B3-948B-1728B52AA6E4}">
-                <adec:decorative xmlns:adec="http://schemas.microsoft.com/office/drawing/2017/decorative" val="1"/>
+                <a16:creationId xmlns:a16="http://schemas.microsoft.com/office/drawing/2014/main" id="{3237E018-3171-4F76-830C-B2F8144A1358}"/>
               </a:ext>
             </a:extLst>
           </p:cNvPr>
           <p:cNvSpPr>
-            <a:spLocks noGrp="1" noRot="1" noChangeAspect="1" noMove="1" noResize="1" noEditPoints="1" noAdjustHandles="1" noChangeArrowheads="1" noChangeShapeType="1" noTextEdit="1"/>
-          </p:cNvSpPr>
-          <p:nvPr>
+            <a:spLocks noGrp="1"/>
+          </p:cNvSpPr>
+          <p:nvPr>
+            <p:ph type="title"/>
+          </p:nvPr>
+        </p:nvSpPr>
+        <p:spPr/>
+        <p:txBody>
+          <a:bodyPr/>
+          <a:lstStyle/>
+          <a:p>
+            <a:endParaRPr lang="en-US"/>
+          </a:p>
+        </p:txBody>
+      </p:sp>
+      <p:pic>
+        <p:nvPicPr>
+          <p:cNvPr id="5" name="Content Placeholder 4">
+            <a:extLst>
+              <a:ext uri="{FF2B5EF4-FFF2-40B4-BE49-F238E27FC236}">
+                <a16:creationId xmlns:a16="http://schemas.microsoft.com/office/drawing/2014/main" id="{4521CF8E-5A54-4EA6-B9DB-A1F1CF41BD31}"/>
+              </a:ext>
+            </a:extLst>
+          </p:cNvPr>
+          <p:cNvPicPr>
+            <a:picLocks noGrp="1" noChangeAspect="1"/>
+          </p:cNvPicPr>
+          <p:nvPr>
+            <p:ph idx="1"/>
+          </p:nvPr>
+        </p:nvPicPr>
+        <p:blipFill>
+          <a:blip r:embed="rId4">
+            <a:extLst>
+              <a:ext uri="{28A0092B-C50C-407E-A947-70E740481C1C}">
+                <a14:useLocalDpi xmlns:a14="http://schemas.microsoft.com/office/drawing/2010/main" val="0"/>
+              </a:ext>
+            </a:extLst>
+          </a:blip>
+          <a:stretch>
+            <a:fillRect/>
+          </a:stretch>
+        </p:blipFill>
+        <p:spPr>
+          <a:xfrm>
+            <a:off x="0" y="0"/>
+            <a:ext cx="12295908" cy="6858000"/>
+          </a:xfrm>
+        </p:spPr>
+      </p:pic>
+      <p:pic>
+        <p:nvPicPr>
+          <p:cNvPr id="6" name="Recorded Sound">
+            <a:hlinkClick r:id="" action="ppaction://media"/>
+            <a:extLst>
+              <a:ext uri="{FF2B5EF4-FFF2-40B4-BE49-F238E27FC236}">
+                <a16:creationId xmlns:a16="http://schemas.microsoft.com/office/drawing/2014/main" id="{6F476EDA-723C-4177-8B65-6A722A553F1B}"/>
+              </a:ext>
+            </a:extLst>
+          </p:cNvPr>
+          <p:cNvPicPr>
+            <a:picLocks noChangeAspect="1"/>
+          </p:cNvPicPr>
+          <p:nvPr>
+            <a:audioFile r:link="rId2"/>
             <p:extLst>
-              <p:ext uri="{386F3935-93C4-4BCD-93E2-E3B085C9AB24}">
-                <p16:designElem xmlns:p16="http://schemas.microsoft.com/office/powerpoint/2015/main" val="1"/>
+              <p:ext uri="{DAA4B4D4-6D71-4841-9C94-3DE7FCFB9230}">
+                <p14:media xmlns:p14="http://schemas.microsoft.com/office/powerpoint/2010/main" r:embed="rId1"/>
               </p:ext>
             </p:extLst>
           </p:nvPr>
-        </p:nvSpPr>
+        </p:nvPicPr>
+        <p:blipFill>
+          <a:blip r:embed="rId5">
+            <a:extLst>
+              <a:ext uri="{BEBA8EAE-BF5A-486C-A8C5-ECC9F3942E4B}">
+                <a14:imgProps xmlns:a14="http://schemas.microsoft.com/office/drawing/2010/main">
+                  <a14:imgLayer r:embed="rId6">
+                    <a14:imgEffect>
+                      <a14:backgroundRemoval t="10000" b="90000" l="10000" r="90000"/>
+                    </a14:imgEffect>
+                  </a14:imgLayer>
+                </a14:imgProps>
+              </a:ext>
+            </a:extLst>
+          </a:blip>
+          <a:stretch>
+            <a:fillRect/>
+          </a:stretch>
+        </p:blipFill>
         <p:spPr>
           <a:xfrm>
-            <a:off x="1541" y="0"/>
-            <a:ext cx="12190459" cy="6858000"/>
+            <a:off x="9552450" y="4386137"/>
+            <a:ext cx="487363" cy="487363"/>
           </a:xfrm>
           <a:prstGeom prst="rect">
             <a:avLst/>
           </a:prstGeom>
-          <a:ln>
-            <a:noFill/>
-          </a:ln>
         </p:spPr>
-        <p:style>
-          <a:lnRef idx="2">
-            <a:schemeClr val="accent1">
-              <a:shade val="50000"/>
-            </a:schemeClr>
-          </a:lnRef>
-          <a:fillRef idx="1">
-            <a:schemeClr val="accent1"/>
-          </a:fillRef>
-          <a:effectRef idx="0">
-            <a:schemeClr val="accent1"/>
-          </a:effectRef>
-          <a:fontRef idx="minor">
-            <a:schemeClr val="lt1"/>
-          </a:fontRef>
-        </p:style>
-        <p:txBody>
-          <a:bodyPr rtlCol="0" anchor="ctr"/>
-          <a:lstStyle/>
-          <a:p>
-            <a:pPr algn="ctr"/>
-            <a:endParaRPr lang="en-US"/>
-          </a:p>
-        </p:txBody>
-      </p:sp>
-      <p:sp>
-        <p:nvSpPr>
-          <p:cNvPr id="14" name="Rectangle 13">
+      </p:pic>
+      <p:sp>
+        <p:nvSpPr>
+          <p:cNvPr id="7" name="Title 1">
             <a:extLst>
               <a:ext uri="{FF2B5EF4-FFF2-40B4-BE49-F238E27FC236}">
-                <a16:creationId xmlns:a16="http://schemas.microsoft.com/office/drawing/2014/main" id="{1DE08FC9-B942-43D7-84C0-114C179E75A7}"/>
-              </a:ext>
-              <a:ext uri="{C183D7F6-B498-43B3-948B-1728B52AA6E4}">
-                <adec:decorative xmlns:adec="http://schemas.microsoft.com/office/drawing/2017/decorative" val="1"/>
+                <a16:creationId xmlns:a16="http://schemas.microsoft.com/office/drawing/2014/main" id="{4B654031-544B-4F36-B782-9853BDFE6B7D}"/>
               </a:ext>
             </a:extLst>
           </p:cNvPr>
-          <p:cNvSpPr>
-            <a:spLocks noGrp="1" noRot="1" noChangeAspect="1" noMove="1" noResize="1" noEditPoints="1" noAdjustHandles="1" noChangeArrowheads="1" noChangeShapeType="1" noTextEdit="1"/>
-          </p:cNvSpPr>
-          <p:nvPr>
-            <p:extLst>
-              <p:ext uri="{386F3935-93C4-4BCD-93E2-E3B085C9AB24}">
-                <p16:designElem xmlns:p16="http://schemas.microsoft.com/office/powerpoint/2015/main" val="1"/>
-              </p:ext>
-            </p:extLst>
-          </p:nvPr>
-        </p:nvSpPr>
-        <p:spPr bwMode="white">
-          <a:xfrm>
-            <a:off x="16" y="0"/>
-            <a:ext cx="4584734" cy="6858000"/>
-          </a:xfrm>
-          <a:prstGeom prst="rect">
-            <a:avLst/>
-          </a:prstGeom>
-          <a:solidFill>
-            <a:schemeClr val="accent4">
-              <a:lumMod val="75000"/>
-            </a:schemeClr>
-          </a:solidFill>
-          <a:ln>
-            <a:noFill/>
-          </a:ln>
-        </p:spPr>
-        <p:style>
-          <a:lnRef idx="2">
-            <a:schemeClr val="accent1">
-              <a:shade val="50000"/>
-            </a:schemeClr>
-          </a:lnRef>
-          <a:fillRef idx="1">
-            <a:schemeClr val="accent1"/>
-          </a:fillRef>
-          <a:effectRef idx="0">
-            <a:schemeClr val="accent1"/>
-          </a:effectRef>
-          <a:fontRef idx="minor">
-            <a:schemeClr val="lt1"/>
-          </a:fontRef>
-        </p:style>
-      </p:sp>
-      <p:sp>
-        <p:nvSpPr>
-          <p:cNvPr id="2" name="Title 1">
-            <a:extLst>
-              <a:ext uri="{FF2B5EF4-FFF2-40B4-BE49-F238E27FC236}">
-                <a16:creationId xmlns:a16="http://schemas.microsoft.com/office/drawing/2014/main" id="{3E28679E-178D-4F7A-BE05-280758DEC1D4}"/>
-              </a:ext>
-            </a:extLst>
-          </p:cNvPr>
-          <p:cNvSpPr>
-            <a:spLocks noGrp="1"/>
-          </p:cNvSpPr>
-          <p:nvPr>
-            <p:ph type="ctrTitle"/>
-          </p:nvPr>
+          <p:cNvSpPr txBox="1">
+            <a:spLocks/>
+          </p:cNvSpPr>
+          <p:nvPr/>
         </p:nvSpPr>
         <p:spPr>
           <a:xfrm>
             <a:off x="457200" y="1058573"/>
             <a:ext cx="3659246" cy="2926080"/>
           </a:xfrm>
+          <a:prstGeom prst="rect">
+            <a:avLst/>
+          </a:prstGeom>
         </p:spPr>
         <p:txBody>
-          <a:bodyPr>
+          <a:bodyPr vert="horz" lIns="91440" tIns="45720" rIns="91440" bIns="45720" rtlCol="0" anchor="b">
             <a:normAutofit/>
           </a:bodyPr>
-          <a:lstStyle/>
+          <a:lstStyle>
+            <a:lvl1pPr algn="l" defTabSz="914400" rtl="0" eaLnBrk="1" latinLnBrk="0" hangingPunct="1">
+              <a:lnSpc>
+                <a:spcPct val="85000"/>
+              </a:lnSpc>
+              <a:spcBef>
+                <a:spcPct val="0"/>
+              </a:spcBef>
+              <a:buNone/>
+              <a:defRPr sz="4800" kern="1200" spc="-50" baseline="0">
+                <a:solidFill>
+                  <a:schemeClr val="tx1">
+                    <a:lumMod val="75000"/>
+                    <a:lumOff val="25000"/>
+                  </a:schemeClr>
+                </a:solidFill>
+                <a:latin typeface="+mj-lt"/>
+                <a:ea typeface="+mj-ea"/>
+                <a:cs typeface="+mj-cs"/>
+              </a:defRPr>
+            </a:lvl1pPr>
+          </a:lstStyle>
           <a:p>
             <a:r>
               <a:rPr lang="bg-BG" sz="5400">
@@ -12327,7 +12334,7 @@
               </a:rPr>
               <a:t>Използвани технологии</a:t>
             </a:r>
-            <a:endParaRPr lang="en-US" sz="5400">
+            <a:endParaRPr lang="en-US" sz="5400" dirty="0">
               <a:solidFill>
                 <a:srgbClr val="FFFFFF"/>
               </a:solidFill>
@@ -12335,339 +12342,12 @@
           </a:p>
         </p:txBody>
       </p:sp>
-      <p:sp>
-        <p:nvSpPr>
-          <p:cNvPr id="16" name="Rectangle 15">
+      <p:pic>
+        <p:nvPicPr>
+          <p:cNvPr id="8" name="Picture 7" descr="Github Logo - Free social media icons">
             <a:extLst>
               <a:ext uri="{FF2B5EF4-FFF2-40B4-BE49-F238E27FC236}">
-                <a16:creationId xmlns:a16="http://schemas.microsoft.com/office/drawing/2014/main" id="{D1F2E844-8B21-4757-ACE2-AEB5C3B7E39D}"/>
-              </a:ext>
-              <a:ext uri="{C183D7F6-B498-43B3-948B-1728B52AA6E4}">
-                <adec:decorative xmlns:adec="http://schemas.microsoft.com/office/drawing/2017/decorative" val="1"/>
-              </a:ext>
-            </a:extLst>
-          </p:cNvPr>
-          <p:cNvSpPr>
-            <a:spLocks noGrp="1" noRot="1" noChangeAspect="1" noMove="1" noResize="1" noEditPoints="1" noAdjustHandles="1" noChangeArrowheads="1" noChangeShapeType="1" noTextEdit="1"/>
-          </p:cNvSpPr>
-          <p:nvPr>
-            <p:extLst>
-              <p:ext uri="{386F3935-93C4-4BCD-93E2-E3B085C9AB24}">
-                <p16:designElem xmlns:p16="http://schemas.microsoft.com/office/powerpoint/2015/main" val="1"/>
-              </p:ext>
-            </p:extLst>
-          </p:nvPr>
-        </p:nvSpPr>
-        <p:spPr>
-          <a:xfrm>
-            <a:off x="4584751" y="0"/>
-            <a:ext cx="64008" cy="6858000"/>
-          </a:xfrm>
-          <a:prstGeom prst="rect">
-            <a:avLst/>
-          </a:prstGeom>
-          <a:solidFill>
-            <a:schemeClr val="accent4"/>
-          </a:solidFill>
-          <a:ln>
-            <a:noFill/>
-          </a:ln>
-        </p:spPr>
-        <p:style>
-          <a:lnRef idx="2">
-            <a:schemeClr val="accent1">
-              <a:shade val="50000"/>
-            </a:schemeClr>
-          </a:lnRef>
-          <a:fillRef idx="1">
-            <a:schemeClr val="accent1"/>
-          </a:fillRef>
-          <a:effectRef idx="0">
-            <a:schemeClr val="accent1"/>
-          </a:effectRef>
-          <a:fontRef idx="minor">
-            <a:schemeClr val="lt1"/>
-          </a:fontRef>
-        </p:style>
-      </p:sp>
-      <p:sp>
-        <p:nvSpPr>
-          <p:cNvPr id="18" name="Rectangle 17">
-            <a:extLst>
-              <a:ext uri="{FF2B5EF4-FFF2-40B4-BE49-F238E27FC236}">
-                <a16:creationId xmlns:a16="http://schemas.microsoft.com/office/drawing/2014/main" id="{FCF6B754-DA99-48D0-A75F-DDFEF6258103}"/>
-              </a:ext>
-              <a:ext uri="{C183D7F6-B498-43B3-948B-1728B52AA6E4}">
-                <adec:decorative xmlns:adec="http://schemas.microsoft.com/office/drawing/2017/decorative" val="1"/>
-              </a:ext>
-            </a:extLst>
-          </p:cNvPr>
-          <p:cNvSpPr>
-            <a:spLocks noGrp="1" noRot="1" noChangeAspect="1" noMove="1" noResize="1" noEditPoints="1" noAdjustHandles="1" noChangeArrowheads="1" noChangeShapeType="1" noTextEdit="1"/>
-          </p:cNvSpPr>
-          <p:nvPr>
-            <p:extLst>
-              <p:ext uri="{386F3935-93C4-4BCD-93E2-E3B085C9AB24}">
-                <p16:designElem xmlns:p16="http://schemas.microsoft.com/office/powerpoint/2015/main" val="1"/>
-              </p:ext>
-            </p:extLst>
-          </p:nvPr>
-        </p:nvSpPr>
-        <p:spPr>
-          <a:xfrm>
-            <a:off x="4965290" y="321732"/>
-            <a:ext cx="3654966" cy="3674848"/>
-          </a:xfrm>
-          <a:prstGeom prst="rect">
-            <a:avLst/>
-          </a:prstGeom>
-          <a:solidFill>
-            <a:srgbClr val="FFFFFF"/>
-          </a:solidFill>
-          <a:ln w="63500">
-            <a:solidFill>
-              <a:schemeClr val="accent4"/>
-            </a:solidFill>
-            <a:miter lim="800000"/>
-          </a:ln>
-        </p:spPr>
-        <p:style>
-          <a:lnRef idx="2">
-            <a:schemeClr val="accent1">
-              <a:shade val="50000"/>
-            </a:schemeClr>
-          </a:lnRef>
-          <a:fillRef idx="1">
-            <a:schemeClr val="accent1"/>
-          </a:fillRef>
-          <a:effectRef idx="0">
-            <a:schemeClr val="accent1"/>
-          </a:effectRef>
-          <a:fontRef idx="minor">
-            <a:schemeClr val="lt1"/>
-          </a:fontRef>
-        </p:style>
-        <p:txBody>
-          <a:bodyPr rtlCol="0" anchor="ctr"/>
-          <a:lstStyle/>
-          <a:p>
-            <a:pPr algn="ctr"/>
-            <a:endParaRPr lang="en-US"/>
-          </a:p>
-        </p:txBody>
-      </p:sp>
-      <p:pic>
-        <p:nvPicPr>
-          <p:cNvPr id="6" name="Picture 5" descr="Visual Studio Logo transparent PNG - StickPNG">
-            <a:extLst>
-              <a:ext uri="{FF2B5EF4-FFF2-40B4-BE49-F238E27FC236}">
-                <a16:creationId xmlns:a16="http://schemas.microsoft.com/office/drawing/2014/main" id="{304B2F68-0F2E-4270-BCC7-38D766C1005B}"/>
-              </a:ext>
-            </a:extLst>
-          </p:cNvPr>
-          <p:cNvPicPr>
-            <a:picLocks noChangeAspect="1"/>
-          </p:cNvPicPr>
-          <p:nvPr/>
-        </p:nvPicPr>
-        <p:blipFill>
-          <a:blip r:embed="rId5" cstate="print">
-            <a:extLst>
-              <a:ext uri="{28A0092B-C50C-407E-A947-70E740481C1C}">
-                <a14:useLocalDpi xmlns:a14="http://schemas.microsoft.com/office/drawing/2010/main" val="0"/>
-              </a:ext>
-            </a:extLst>
-          </a:blip>
-          <a:stretch>
-            <a:fillRect/>
-          </a:stretch>
-        </p:blipFill>
-        <p:spPr bwMode="auto">
-          <a:xfrm>
-            <a:off x="5171713" y="485804"/>
-            <a:ext cx="3242119" cy="3346704"/>
-          </a:xfrm>
-          <a:prstGeom prst="rect">
-            <a:avLst/>
-          </a:prstGeom>
-          <a:noFill/>
-        </p:spPr>
-      </p:pic>
-      <p:sp>
-        <p:nvSpPr>
-          <p:cNvPr id="20" name="Rectangle 19">
-            <a:extLst>
-              <a:ext uri="{FF2B5EF4-FFF2-40B4-BE49-F238E27FC236}">
-                <a16:creationId xmlns:a16="http://schemas.microsoft.com/office/drawing/2014/main" id="{DE1BEBA0-CCB7-473E-95B9-584AAE451937}"/>
-              </a:ext>
-              <a:ext uri="{C183D7F6-B498-43B3-948B-1728B52AA6E4}">
-                <adec:decorative xmlns:adec="http://schemas.microsoft.com/office/drawing/2017/decorative" val="1"/>
-              </a:ext>
-            </a:extLst>
-          </p:cNvPr>
-          <p:cNvSpPr>
-            <a:spLocks noGrp="1" noRot="1" noChangeAspect="1" noMove="1" noResize="1" noEditPoints="1" noAdjustHandles="1" noChangeArrowheads="1" noChangeShapeType="1" noTextEdit="1"/>
-          </p:cNvSpPr>
-          <p:nvPr>
-            <p:extLst>
-              <p:ext uri="{386F3935-93C4-4BCD-93E2-E3B085C9AB24}">
-                <p16:designElem xmlns:p16="http://schemas.microsoft.com/office/powerpoint/2015/main" val="1"/>
-              </p:ext>
-            </p:extLst>
-          </p:nvPr>
-        </p:nvSpPr>
-        <p:spPr>
-          <a:xfrm>
-            <a:off x="8798288" y="321732"/>
-            <a:ext cx="3068701" cy="2108201"/>
-          </a:xfrm>
-          <a:prstGeom prst="rect">
-            <a:avLst/>
-          </a:prstGeom>
-          <a:solidFill>
-            <a:srgbClr val="FFFFFF"/>
-          </a:solidFill>
-          <a:ln w="63500">
-            <a:solidFill>
-              <a:schemeClr val="accent4"/>
-            </a:solidFill>
-            <a:miter lim="800000"/>
-          </a:ln>
-        </p:spPr>
-        <p:style>
-          <a:lnRef idx="2">
-            <a:schemeClr val="accent1">
-              <a:shade val="50000"/>
-            </a:schemeClr>
-          </a:lnRef>
-          <a:fillRef idx="1">
-            <a:schemeClr val="accent1"/>
-          </a:fillRef>
-          <a:effectRef idx="0">
-            <a:schemeClr val="accent1"/>
-          </a:effectRef>
-          <a:fontRef idx="minor">
-            <a:schemeClr val="lt1"/>
-          </a:fontRef>
-        </p:style>
-        <p:txBody>
-          <a:bodyPr rtlCol="0" anchor="ctr"/>
-          <a:lstStyle/>
-          <a:p>
-            <a:pPr algn="ctr"/>
-            <a:endParaRPr lang="en-US"/>
-          </a:p>
-        </p:txBody>
-      </p:sp>
-      <p:pic>
-        <p:nvPicPr>
-          <p:cNvPr id="7" name="Picture 6" descr="Discord Logo Png - Free Transparent PNG Logos">
-            <a:extLst>
-              <a:ext uri="{FF2B5EF4-FFF2-40B4-BE49-F238E27FC236}">
-                <a16:creationId xmlns:a16="http://schemas.microsoft.com/office/drawing/2014/main" id="{53002ACE-5A98-46FD-AB62-AAC20BFE55B2}"/>
-              </a:ext>
-            </a:extLst>
-          </p:cNvPr>
-          <p:cNvPicPr>
-            <a:picLocks noChangeAspect="1"/>
-          </p:cNvPicPr>
-          <p:nvPr/>
-        </p:nvPicPr>
-        <p:blipFill>
-          <a:blip r:embed="rId6" cstate="print">
-            <a:extLst>
-              <a:ext uri="{28A0092B-C50C-407E-A947-70E740481C1C}">
-                <a14:useLocalDpi xmlns:a14="http://schemas.microsoft.com/office/drawing/2010/main" val="0"/>
-              </a:ext>
-            </a:extLst>
-          </a:blip>
-          <a:stretch>
-            <a:fillRect/>
-          </a:stretch>
-        </p:blipFill>
-        <p:spPr bwMode="auto">
-          <a:xfrm>
-            <a:off x="9440484" y="483762"/>
-            <a:ext cx="1784309" cy="1784309"/>
-          </a:xfrm>
-          <a:prstGeom prst="rect">
-            <a:avLst/>
-          </a:prstGeom>
-          <a:noFill/>
-        </p:spPr>
-      </p:pic>
-      <p:sp>
-        <p:nvSpPr>
-          <p:cNvPr id="22" name="Rectangle 21">
-            <a:extLst>
-              <a:ext uri="{FF2B5EF4-FFF2-40B4-BE49-F238E27FC236}">
-                <a16:creationId xmlns:a16="http://schemas.microsoft.com/office/drawing/2014/main" id="{926F5D50-F086-4ED8-991F-18EFA96DA3A8}"/>
-              </a:ext>
-              <a:ext uri="{C183D7F6-B498-43B3-948B-1728B52AA6E4}">
-                <adec:decorative xmlns:adec="http://schemas.microsoft.com/office/drawing/2017/decorative" val="1"/>
-              </a:ext>
-            </a:extLst>
-          </p:cNvPr>
-          <p:cNvSpPr>
-            <a:spLocks noGrp="1" noRot="1" noChangeAspect="1" noMove="1" noResize="1" noEditPoints="1" noAdjustHandles="1" noChangeArrowheads="1" noChangeShapeType="1" noTextEdit="1"/>
-          </p:cNvSpPr>
-          <p:nvPr>
-            <p:extLst>
-              <p:ext uri="{386F3935-93C4-4BCD-93E2-E3B085C9AB24}">
-                <p16:designElem xmlns:p16="http://schemas.microsoft.com/office/powerpoint/2015/main" val="1"/>
-              </p:ext>
-            </p:extLst>
-          </p:nvPr>
-        </p:nvSpPr>
-        <p:spPr>
-          <a:xfrm>
-            <a:off x="4965290" y="4157448"/>
-            <a:ext cx="3654966" cy="2302337"/>
-          </a:xfrm>
-          <a:prstGeom prst="rect">
-            <a:avLst/>
-          </a:prstGeom>
-          <a:solidFill>
-            <a:srgbClr val="FFFFFF"/>
-          </a:solidFill>
-          <a:ln w="63500">
-            <a:solidFill>
-              <a:schemeClr val="accent4"/>
-            </a:solidFill>
-            <a:miter lim="800000"/>
-          </a:ln>
-        </p:spPr>
-        <p:style>
-          <a:lnRef idx="2">
-            <a:schemeClr val="accent1">
-              <a:shade val="50000"/>
-            </a:schemeClr>
-          </a:lnRef>
-          <a:fillRef idx="1">
-            <a:schemeClr val="accent1"/>
-          </a:fillRef>
-          <a:effectRef idx="0">
-            <a:schemeClr val="accent1"/>
-          </a:effectRef>
-          <a:fontRef idx="minor">
-            <a:schemeClr val="lt1"/>
-          </a:fontRef>
-        </p:style>
-        <p:txBody>
-          <a:bodyPr rtlCol="0" anchor="ctr"/>
-          <a:lstStyle/>
-          <a:p>
-            <a:pPr algn="ctr"/>
-            <a:endParaRPr lang="en-US"/>
-          </a:p>
-        </p:txBody>
-      </p:sp>
-      <p:pic>
-        <p:nvPicPr>
-          <p:cNvPr id="5" name="Picture 4" descr="Github Logo - Free social media icons">
-            <a:extLst>
-              <a:ext uri="{FF2B5EF4-FFF2-40B4-BE49-F238E27FC236}">
-                <a16:creationId xmlns:a16="http://schemas.microsoft.com/office/drawing/2014/main" id="{C1DBF5EC-C384-4C41-9C03-9C9EDBBFFA0C}"/>
+                <a16:creationId xmlns:a16="http://schemas.microsoft.com/office/drawing/2014/main" id="{DE51D7D9-AA2B-4AFD-8443-699984B1F225}"/>
               </a:ext>
             </a:extLst>
           </p:cNvPr>
@@ -12699,78 +12379,12 @@
           <a:noFill/>
         </p:spPr>
       </p:pic>
-      <p:sp>
-        <p:nvSpPr>
-          <p:cNvPr id="24" name="Rectangle 23">
+      <p:pic>
+        <p:nvPicPr>
+          <p:cNvPr id="9" name="Picture 8" descr="Icon&#10;&#10;Description automatically generated">
             <a:extLst>
               <a:ext uri="{FF2B5EF4-FFF2-40B4-BE49-F238E27FC236}">
-                <a16:creationId xmlns:a16="http://schemas.microsoft.com/office/drawing/2014/main" id="{B225AD92-6EBF-447D-8485-585933C3B058}"/>
-              </a:ext>
-              <a:ext uri="{C183D7F6-B498-43B3-948B-1728B52AA6E4}">
-                <adec:decorative xmlns:adec="http://schemas.microsoft.com/office/drawing/2017/decorative" val="1"/>
-              </a:ext>
-            </a:extLst>
-          </p:cNvPr>
-          <p:cNvSpPr>
-            <a:spLocks noGrp="1" noRot="1" noChangeAspect="1" noMove="1" noResize="1" noEditPoints="1" noAdjustHandles="1" noChangeArrowheads="1" noChangeShapeType="1" noTextEdit="1"/>
-          </p:cNvSpPr>
-          <p:nvPr>
-            <p:extLst>
-              <p:ext uri="{386F3935-93C4-4BCD-93E2-E3B085C9AB24}">
-                <p16:designElem xmlns:p16="http://schemas.microsoft.com/office/powerpoint/2015/main" val="1"/>
-              </p:ext>
-            </p:extLst>
-          </p:nvPr>
-        </p:nvSpPr>
-        <p:spPr>
-          <a:xfrm>
-            <a:off x="8798288" y="2617577"/>
-            <a:ext cx="3068701" cy="3809118"/>
-          </a:xfrm>
-          <a:prstGeom prst="rect">
-            <a:avLst/>
-          </a:prstGeom>
-          <a:solidFill>
-            <a:srgbClr val="FFFFFF"/>
-          </a:solidFill>
-          <a:ln w="63500">
-            <a:solidFill>
-              <a:schemeClr val="accent4"/>
-            </a:solidFill>
-            <a:miter lim="800000"/>
-          </a:ln>
-        </p:spPr>
-        <p:style>
-          <a:lnRef idx="2">
-            <a:schemeClr val="accent1">
-              <a:shade val="50000"/>
-            </a:schemeClr>
-          </a:lnRef>
-          <a:fillRef idx="1">
-            <a:schemeClr val="accent1"/>
-          </a:fillRef>
-          <a:effectRef idx="0">
-            <a:schemeClr val="accent1"/>
-          </a:effectRef>
-          <a:fontRef idx="minor">
-            <a:schemeClr val="lt1"/>
-          </a:fontRef>
-        </p:style>
-        <p:txBody>
-          <a:bodyPr rtlCol="0" anchor="ctr"/>
-          <a:lstStyle/>
-          <a:p>
-            <a:pPr algn="ctr"/>
-            <a:endParaRPr lang="en-US"/>
-          </a:p>
-        </p:txBody>
-      </p:sp>
-      <p:pic>
-        <p:nvPicPr>
-          <p:cNvPr id="4" name="Picture 3" descr="Icon&#10;&#10;Description automatically generated">
-            <a:extLst>
-              <a:ext uri="{FF2B5EF4-FFF2-40B4-BE49-F238E27FC236}">
-                <a16:creationId xmlns:a16="http://schemas.microsoft.com/office/drawing/2014/main" id="{7BFD07AB-44E2-4AED-B318-1B046ADF7EDE}"/>
+                <a16:creationId xmlns:a16="http://schemas.microsoft.com/office/drawing/2014/main" id="{F13BEB2E-5310-4F4E-98B6-BF3517AA0348}"/>
               </a:ext>
             </a:extLst>
           </p:cNvPr>
@@ -12804,56 +12418,89 @@
       </p:pic>
       <p:pic>
         <p:nvPicPr>
-          <p:cNvPr id="8" name="Recorded Sound">
-            <a:hlinkClick r:id="" action="ppaction://media"/>
+          <p:cNvPr id="10" name="Picture 9" descr="Discord Logo Png - Free Transparent PNG Logos">
             <a:extLst>
               <a:ext uri="{FF2B5EF4-FFF2-40B4-BE49-F238E27FC236}">
-                <a16:creationId xmlns:a16="http://schemas.microsoft.com/office/drawing/2014/main" id="{925DB700-41B8-4D84-B8A4-A4ED238537C9}"/>
+                <a16:creationId xmlns:a16="http://schemas.microsoft.com/office/drawing/2014/main" id="{BDB44804-FB1E-43E0-89AA-E5A22CF9426A}"/>
               </a:ext>
             </a:extLst>
           </p:cNvPr>
           <p:cNvPicPr>
             <a:picLocks noChangeAspect="1"/>
           </p:cNvPicPr>
-          <p:nvPr>
-            <a:audioFile r:link="rId3"/>
-            <p:extLst>
-              <p:ext uri="{DAA4B4D4-6D71-4841-9C94-3DE7FCFB9230}">
-                <p14:media xmlns:p14="http://schemas.microsoft.com/office/powerpoint/2010/main" r:embed="rId2"/>
-              </p:ext>
-            </p:extLst>
-          </p:nvPr>
+          <p:nvPr/>
         </p:nvPicPr>
         <p:blipFill>
-          <a:blip r:embed="rId9"/>
+          <a:blip r:embed="rId9" cstate="print">
+            <a:extLst>
+              <a:ext uri="{28A0092B-C50C-407E-A947-70E740481C1C}">
+                <a14:useLocalDpi xmlns:a14="http://schemas.microsoft.com/office/drawing/2010/main" val="0"/>
+              </a:ext>
+            </a:extLst>
+          </a:blip>
           <a:stretch>
             <a:fillRect/>
           </a:stretch>
         </p:blipFill>
-        <p:spPr>
+        <p:spPr bwMode="auto">
           <a:xfrm>
-            <a:off x="2557763" y="4433626"/>
-            <a:ext cx="0" cy="0"/>
+            <a:off x="9440484" y="483762"/>
+            <a:ext cx="1784309" cy="1784309"/>
           </a:xfrm>
           <a:prstGeom prst="rect">
             <a:avLst/>
           </a:prstGeom>
+          <a:noFill/>
+        </p:spPr>
+      </p:pic>
+      <p:pic>
+        <p:nvPicPr>
+          <p:cNvPr id="11" name="Picture 10" descr="Visual Studio Logo transparent PNG - StickPNG">
+            <a:extLst>
+              <a:ext uri="{FF2B5EF4-FFF2-40B4-BE49-F238E27FC236}">
+                <a16:creationId xmlns:a16="http://schemas.microsoft.com/office/drawing/2014/main" id="{DBBA78A1-2AC2-4A87-AA0C-2510F4928104}"/>
+              </a:ext>
+            </a:extLst>
+          </p:cNvPr>
+          <p:cNvPicPr>
+            <a:picLocks noChangeAspect="1"/>
+          </p:cNvPicPr>
+          <p:nvPr/>
+        </p:nvPicPr>
+        <p:blipFill>
+          <a:blip r:embed="rId10" cstate="print">
+            <a:extLst>
+              <a:ext uri="{28A0092B-C50C-407E-A947-70E740481C1C}">
+                <a14:useLocalDpi xmlns:a14="http://schemas.microsoft.com/office/drawing/2010/main" val="0"/>
+              </a:ext>
+            </a:extLst>
+          </a:blip>
+          <a:stretch>
+            <a:fillRect/>
+          </a:stretch>
+        </p:blipFill>
+        <p:spPr bwMode="auto">
+          <a:xfrm>
+            <a:off x="5171713" y="485804"/>
+            <a:ext cx="3242119" cy="3346704"/>
+          </a:xfrm>
+          <a:prstGeom prst="rect">
+            <a:avLst/>
+          </a:prstGeom>
+          <a:noFill/>
         </p:spPr>
       </p:pic>
     </p:spTree>
-    <p:custDataLst>
-      <p:tags r:id="rId1"/>
-    </p:custDataLst>
     <p:extLst>
       <p:ext uri="{BB962C8B-B14F-4D97-AF65-F5344CB8AC3E}">
-        <p14:creationId xmlns:p14="http://schemas.microsoft.com/office/powerpoint/2010/main" val="4213299015"/>
+        <p14:creationId xmlns:p14="http://schemas.microsoft.com/office/powerpoint/2010/main" val="1397503609"/>
       </p:ext>
     </p:extLst>
   </p:cSld>
   <p:clrMapOvr>
     <a:masterClrMapping/>
   </p:clrMapOvr>
-  <p:transition spd="slow" advTm="23710">
+  <p:transition spd="slow">
     <p:cover/>
   </p:transition>
   <p:timing>
@@ -12868,6 +12515,9 @@
                     <p:cTn id="3" fill="hold">
                       <p:stCondLst>
                         <p:cond delay="indefinite"/>
+                        <p:cond evt="onBegin" delay="0">
+                          <p:tn val="2"/>
+                        </p:cond>
                       </p:stCondLst>
                       <p:childTnLst>
                         <p:par>
@@ -12877,16 +12527,16 @@
                             </p:stCondLst>
                             <p:childTnLst>
                               <p:par>
-                                <p:cTn id="5" presetID="1" presetClass="mediacall" presetSubtype="0" fill="hold" nodeType="clickEffect">
+                                <p:cTn id="5" presetID="1" presetClass="mediacall" presetSubtype="0" fill="hold" nodeType="afterEffect">
                                   <p:stCondLst>
                                     <p:cond delay="0"/>
                                   </p:stCondLst>
                                   <p:childTnLst>
                                     <p:cmd type="call" cmd="playFrom(0.0)">
                                       <p:cBhvr>
-                                        <p:cTn id="6" dur="23694" fill="hold"/>
+                                        <p:cTn id="6" dur="1" fill="hold"/>
                                         <p:tgtEl>
-                                          <p:spTgt spid="8"/>
+                                          <p:spTgt spid="6"/>
                                         </p:tgtEl>
                                       </p:cBhvr>
                                     </p:cmd>
@@ -12917,8 +12567,8 @@
               </p:nextCondLst>
             </p:seq>
             <p:audio>
-              <p:cMediaNode vol="80000">
-                <p:cTn id="7" fill="hold" display="0">
+              <p:cMediaNode vol="80000" numSld="999" showWhenStopped="0">
+                <p:cTn id="7" repeatCount="indefinite" fill="hold" display="0">
                   <p:stCondLst>
                     <p:cond delay="indefinite"/>
                   </p:stCondLst>
@@ -12931,7 +12581,7 @@
                   </p:endCondLst>
                 </p:cTn>
                 <p:tgtEl>
-                  <p:spTgt spid="8"/>
+                  <p:spTgt spid="6"/>
                 </p:tgtEl>
               </p:cMediaNode>
             </p:audio>
@@ -12940,14 +12590,6 @@
       </p:par>
     </p:tnLst>
   </p:timing>
-  <p:extLst>
-    <p:ext uri="{E180D4A7-C9FB-4DFB-919C-405C955672EB}">
-      <p14:showEvtLst xmlns:p14="http://schemas.microsoft.com/office/powerpoint/2010/main">
-        <p14:playEvt time="365" objId="8"/>
-        <p14:stopEvt time="23710" objId="8"/>
-      </p14:showEvtLst>
-    </p:ext>
-  </p:extLst>
 </p:sld>
 </file>
 
@@ -13551,14 +13193,14 @@
           <a:lstStyle/>
           <a:p>
             <a:r>
-              <a:rPr lang="bg-BG" sz="3600">
+              <a:rPr lang="bg-BG" sz="3600" dirty="0">
                 <a:solidFill>
                   <a:srgbClr val="FFFFFF"/>
                 </a:solidFill>
               </a:rPr>
               <a:t>Преглед на крайния продукт</a:t>
             </a:r>
-            <a:endParaRPr lang="en-US" sz="3600">
+            <a:endParaRPr lang="en-US" sz="3600" dirty="0">
               <a:solidFill>
                 <a:srgbClr val="FFFFFF"/>
               </a:solidFill>
@@ -14076,12 +13718,6 @@
 </file>
 
 <file path=ppt/tags/tag4.xml><?xml version="1.0" encoding="utf-8"?>
-<p:tagLst xmlns:a="http://schemas.openxmlformats.org/drawingml/2006/main" xmlns:r="http://schemas.openxmlformats.org/officeDocument/2006/relationships" xmlns:p="http://schemas.openxmlformats.org/presentationml/2006/main">
-  <p:tag name="TIMING" val="|0.3"/>
-</p:tagLst>
-</file>
-
-<file path=ppt/tags/tag5.xml><?xml version="1.0" encoding="utf-8"?>
 <p:tagLst xmlns:a="http://schemas.openxmlformats.org/drawingml/2006/main" xmlns:r="http://schemas.openxmlformats.org/officeDocument/2006/relationships" xmlns:p="http://schemas.openxmlformats.org/presentationml/2006/main">
   <p:tag name="TIMING" val="|0.4"/>
 </p:tagLst>

</xml_diff>